<commit_message>
Fixed some mistakes in the ppt
</commit_message>
<xml_diff>
--- a/reports/submit/part2/pre-part2.pptx
+++ b/reports/submit/part2/pre-part2.pptx
@@ -6,12 +6,11 @@
   </p:sldMasterIdLst>
   <p:sldIdLst>
     <p:sldId id="261" r:id="rId3"/>
-    <p:sldId id="259" r:id="rId4"/>
-    <p:sldId id="256" r:id="rId5"/>
-    <p:sldId id="258" r:id="rId6"/>
-    <p:sldId id="257" r:id="rId7"/>
-    <p:sldId id="263" r:id="rId8"/>
-    <p:sldId id="262" r:id="rId9"/>
+    <p:sldId id="256" r:id="rId4"/>
+    <p:sldId id="258" r:id="rId5"/>
+    <p:sldId id="257" r:id="rId6"/>
+    <p:sldId id="263" r:id="rId7"/>
+    <p:sldId id="262" r:id="rId8"/>
   </p:sldIdLst>
   <p:sldSz cx="9144000" cy="6858000" type="screen4x3"/>
   <p:notesSz cx="6858000" cy="9144000"/>
@@ -3080,1520 +3079,6 @@
         <p:nvPr/>
       </p:nvGrpSpPr>
       <p:grpSpPr/>
-      <p:sp>
-        <p:nvSpPr>
-          <p:cNvPr id="2" name="Title 1"/>
-          <p:cNvSpPr>
-            <a:spLocks noGrp="1"/>
-          </p:cNvSpPr>
-          <p:nvPr>
-            <p:ph type="title"/>
-          </p:nvPr>
-        </p:nvSpPr>
-        <p:spPr/>
-        <p:txBody>
-          <a:bodyPr/>
-          <a:p>
-            <a:r>
-              <a:rPr lang="x-none" altLang="en-US"/>
-              <a:t>RC5 Timing</a:t>
-            </a:r>
-            <a:endParaRPr lang="x-none" altLang="en-US"/>
-          </a:p>
-        </p:txBody>
-      </p:sp>
-      <p:pic>
-        <p:nvPicPr>
-          <p:cNvPr id="56" name="图片 1"/>
-          <p:cNvPicPr>
-            <a:picLocks noChangeAspect="1"/>
-          </p:cNvPicPr>
-          <p:nvPr/>
-        </p:nvPicPr>
-        <p:blipFill>
-          <a:blip r:embed="rId1" cstate="print">
-            <a:extLst>
-              <a:ext uri="{28A0092B-C50C-407E-A947-70E740481C1C}">
-                <a14:useLocalDpi xmlns:a14="http://schemas.microsoft.com/office/drawing/2010/main" val="0"/>
-              </a:ext>
-            </a:extLst>
-          </a:blip>
-          <a:srcRect t="23651" r="2500" b="24702"/>
-          <a:stretch>
-            <a:fillRect/>
-          </a:stretch>
-        </p:blipFill>
-        <p:spPr>
-          <a:xfrm>
-            <a:off x="802640" y="2679065"/>
-            <a:ext cx="7428865" cy="1117600"/>
-          </a:xfrm>
-          <a:prstGeom prst="rect">
-            <a:avLst/>
-          </a:prstGeom>
-        </p:spPr>
-      </p:pic>
-      <p:pic>
-        <p:nvPicPr>
-          <p:cNvPr id="57" name="图片 2"/>
-          <p:cNvPicPr>
-            <a:picLocks noChangeAspect="1"/>
-          </p:cNvPicPr>
-          <p:nvPr/>
-        </p:nvPicPr>
-        <p:blipFill>
-          <a:blip r:embed="rId2" cstate="print">
-            <a:extLst>
-              <a:ext uri="{28A0092B-C50C-407E-A947-70E740481C1C}">
-                <a14:useLocalDpi xmlns:a14="http://schemas.microsoft.com/office/drawing/2010/main" val="0"/>
-              </a:ext>
-            </a:extLst>
-          </a:blip>
-          <a:srcRect l="-294" t="24054" r="7636" b="25288"/>
-          <a:stretch>
-            <a:fillRect/>
-          </a:stretch>
-        </p:blipFill>
-        <p:spPr>
-          <a:xfrm>
-            <a:off x="771525" y="1401445"/>
-            <a:ext cx="7484110" cy="1198245"/>
-          </a:xfrm>
-          <a:prstGeom prst="rect">
-            <a:avLst/>
-          </a:prstGeom>
-        </p:spPr>
-      </p:pic>
-      <p:graphicFrame>
-        <p:nvGraphicFramePr>
-          <p:cNvPr id="0" name="Table -1"/>
-          <p:cNvGraphicFramePr/>
-          <p:nvPr/>
-        </p:nvGraphicFramePr>
-        <p:xfrm>
-          <a:off x="840105" y="5029835"/>
-          <a:ext cx="7270750" cy="1066800"/>
-        </p:xfrm>
-        <a:graphic>
-          <a:graphicData uri="http://schemas.openxmlformats.org/drawingml/2006/table">
-            <a:tbl>
-              <a:tblPr firstRow="1" bandRow="1">
-                <a:tableStyleId>{5940675A-B579-460E-94D1-54222C63F5DA}</a:tableStyleId>
-              </a:tblPr>
-              <a:tblGrid>
-                <a:gridCol w="1211580"/>
-                <a:gridCol w="1211580"/>
-                <a:gridCol w="1210945"/>
-                <a:gridCol w="1211580"/>
-                <a:gridCol w="1211580"/>
-                <a:gridCol w="1213485"/>
-              </a:tblGrid>
-              <a:tr h="266700">
-                <a:tc>
-                  <a:txBody>
-                    <a:bodyPr/>
-                    <a:p>
-                      <a:pPr marL="0" indent="0" algn="ctr">
-                        <a:buNone/>
-                      </a:pPr>
-                      <a:endParaRPr sz="1600" b="0" u="none">
-                        <a:latin typeface="Ubuntu Mono" charset="0"/>
-                        <a:ea typeface="Ubuntu Mono" charset="0"/>
-                        <a:cs typeface="Ubuntu Mono" charset="0"/>
-                      </a:endParaRPr>
-                    </a:p>
-                  </a:txBody>
-                  <a:tcPr marL="0" marR="0" marT="0" marB="1" vert="horz" anchor="t">
-                    <a:lnL w="12700">
-                      <a:solidFill>
-                        <a:schemeClr val="tx1"/>
-                      </a:solidFill>
-                      <a:prstDash val="solid"/>
-                    </a:lnL>
-                    <a:lnR w="12700">
-                      <a:solidFill>
-                        <a:schemeClr val="tx1"/>
-                      </a:solidFill>
-                      <a:prstDash val="solid"/>
-                    </a:lnR>
-                    <a:lnT w="12700">
-                      <a:solidFill>
-                        <a:schemeClr val="tx1"/>
-                      </a:solidFill>
-                      <a:prstDash val="solid"/>
-                    </a:lnT>
-                    <a:lnB w="12700">
-                      <a:solidFill>
-                        <a:schemeClr val="tx1"/>
-                      </a:solidFill>
-                      <a:prstDash val="solid"/>
-                    </a:lnB>
-                    <a:lnTlToBr>
-                      <a:noFill/>
-                    </a:lnTlToBr>
-                    <a:lnBlToTr>
-                      <a:noFill/>
-                    </a:lnBlToTr>
-                    <a:noFill/>
-                  </a:tcPr>
-                </a:tc>
-                <a:tc>
-                  <a:txBody>
-                    <a:bodyPr/>
-                    <a:p>
-                      <a:pPr marL="0" indent="0" algn="ctr">
-                        <a:buNone/>
-                      </a:pPr>
-                      <a:r>
-                        <a:rPr sz="1600" b="0" u="none">
-                          <a:latin typeface="Ubuntu Mono" charset="0"/>
-                          <a:ea typeface="Ubuntu Mono" charset="0"/>
-                          <a:cs typeface="Ubuntu Mono" charset="0"/>
-                        </a:rPr>
-                        <a:t>Start</a:t>
-                      </a:r>
-                      <a:endParaRPr sz="1600" b="0" u="none">
-                        <a:latin typeface="Ubuntu Mono" charset="0"/>
-                        <a:ea typeface="Ubuntu Mono" charset="0"/>
-                        <a:cs typeface="Ubuntu Mono" charset="0"/>
-                      </a:endParaRPr>
-                    </a:p>
-                  </a:txBody>
-                  <a:tcPr marL="0" marR="0" marT="0" marB="1" vert="horz" anchor="t">
-                    <a:lnL w="12700">
-                      <a:solidFill>
-                        <a:schemeClr val="tx1"/>
-                      </a:solidFill>
-                      <a:prstDash val="solid"/>
-                    </a:lnL>
-                    <a:lnR w="12700">
-                      <a:solidFill>
-                        <a:schemeClr val="tx1"/>
-                      </a:solidFill>
-                      <a:prstDash val="solid"/>
-                    </a:lnR>
-                    <a:lnT w="12700">
-                      <a:solidFill>
-                        <a:schemeClr val="tx1"/>
-                      </a:solidFill>
-                      <a:prstDash val="solid"/>
-                    </a:lnT>
-                    <a:lnB w="12700">
-                      <a:solidFill>
-                        <a:schemeClr val="tx1"/>
-                      </a:solidFill>
-                      <a:prstDash val="solid"/>
-                    </a:lnB>
-                    <a:lnTlToBr>
-                      <a:noFill/>
-                    </a:lnTlToBr>
-                    <a:lnBlToTr>
-                      <a:noFill/>
-                    </a:lnBlToTr>
-                    <a:noFill/>
-                  </a:tcPr>
-                </a:tc>
-                <a:tc>
-                  <a:txBody>
-                    <a:bodyPr/>
-                    <a:p>
-                      <a:pPr marL="0" indent="0" algn="ctr">
-                        <a:buNone/>
-                      </a:pPr>
-                      <a:r>
-                        <a:rPr sz="1600" b="0" u="none">
-                          <a:latin typeface="Ubuntu Mono" charset="0"/>
-                          <a:ea typeface="Ubuntu Mono" charset="0"/>
-                          <a:cs typeface="Ubuntu Mono" charset="0"/>
-                        </a:rPr>
-                        <a:t>End</a:t>
-                      </a:r>
-                      <a:endParaRPr sz="1600" b="0" u="none">
-                        <a:latin typeface="Ubuntu Mono" charset="0"/>
-                        <a:ea typeface="Ubuntu Mono" charset="0"/>
-                        <a:cs typeface="Ubuntu Mono" charset="0"/>
-                      </a:endParaRPr>
-                    </a:p>
-                  </a:txBody>
-                  <a:tcPr marL="0" marR="0" marT="0" marB="1" vert="horz" anchor="t">
-                    <a:lnL w="12700">
-                      <a:solidFill>
-                        <a:schemeClr val="tx1"/>
-                      </a:solidFill>
-                      <a:prstDash val="solid"/>
-                    </a:lnL>
-                    <a:lnR w="12700">
-                      <a:solidFill>
-                        <a:schemeClr val="tx1"/>
-                      </a:solidFill>
-                      <a:prstDash val="solid"/>
-                    </a:lnR>
-                    <a:lnT w="12700">
-                      <a:solidFill>
-                        <a:schemeClr val="tx1"/>
-                      </a:solidFill>
-                      <a:prstDash val="solid"/>
-                    </a:lnT>
-                    <a:lnB w="12700">
-                      <a:solidFill>
-                        <a:schemeClr val="tx1"/>
-                      </a:solidFill>
-                      <a:prstDash val="solid"/>
-                    </a:lnB>
-                    <a:lnTlToBr>
-                      <a:noFill/>
-                    </a:lnTlToBr>
-                    <a:lnBlToTr>
-                      <a:noFill/>
-                    </a:lnBlToTr>
-                    <a:noFill/>
-                  </a:tcPr>
-                </a:tc>
-                <a:tc>
-                  <a:txBody>
-                    <a:bodyPr/>
-                    <a:p>
-                      <a:pPr marL="0" indent="0" algn="ctr">
-                        <a:buNone/>
-                      </a:pPr>
-                      <a:r>
-                        <a:rPr sz="1600" b="0" u="none">
-                          <a:latin typeface="Ubuntu Mono" charset="0"/>
-                          <a:ea typeface="Ubuntu Mono" charset="0"/>
-                          <a:cs typeface="Ubuntu Mono" charset="0"/>
-                        </a:rPr>
-                        <a:t>Time-Diff</a:t>
-                      </a:r>
-                      <a:endParaRPr sz="1600" b="0" u="none">
-                        <a:latin typeface="Ubuntu Mono" charset="0"/>
-                        <a:ea typeface="Ubuntu Mono" charset="0"/>
-                        <a:cs typeface="Ubuntu Mono" charset="0"/>
-                      </a:endParaRPr>
-                    </a:p>
-                  </a:txBody>
-                  <a:tcPr marL="0" marR="0" marT="0" marB="1" vert="horz" anchor="t">
-                    <a:lnL w="12700">
-                      <a:solidFill>
-                        <a:schemeClr val="tx1"/>
-                      </a:solidFill>
-                      <a:prstDash val="solid"/>
-                    </a:lnL>
-                    <a:lnR w="12700">
-                      <a:solidFill>
-                        <a:schemeClr val="tx1"/>
-                      </a:solidFill>
-                      <a:prstDash val="solid"/>
-                    </a:lnR>
-                    <a:lnT w="12700">
-                      <a:solidFill>
-                        <a:schemeClr val="tx1"/>
-                      </a:solidFill>
-                      <a:prstDash val="solid"/>
-                    </a:lnT>
-                    <a:lnB w="12700">
-                      <a:solidFill>
-                        <a:schemeClr val="tx1"/>
-                      </a:solidFill>
-                      <a:prstDash val="solid"/>
-                    </a:lnB>
-                    <a:lnTlToBr>
-                      <a:noFill/>
-                    </a:lnTlToBr>
-                    <a:lnBlToTr>
-                      <a:noFill/>
-                    </a:lnBlToTr>
-                    <a:noFill/>
-                  </a:tcPr>
-                </a:tc>
-                <a:tc>
-                  <a:txBody>
-                    <a:bodyPr/>
-                    <a:p>
-                      <a:pPr marL="0" indent="0" algn="ctr">
-                        <a:buNone/>
-                      </a:pPr>
-                      <a:r>
-                        <a:rPr sz="1600" b="0" u="none">
-                          <a:latin typeface="Ubuntu Mono" charset="0"/>
-                          <a:ea typeface="Ubuntu Mono" charset="0"/>
-                          <a:cs typeface="Ubuntu Mono" charset="0"/>
-                        </a:rPr>
-                        <a:t>Latency</a:t>
-                      </a:r>
-                      <a:endParaRPr sz="1600" b="0" u="none">
-                        <a:latin typeface="Ubuntu Mono" charset="0"/>
-                        <a:ea typeface="Ubuntu Mono" charset="0"/>
-                        <a:cs typeface="Ubuntu Mono" charset="0"/>
-                      </a:endParaRPr>
-                    </a:p>
-                  </a:txBody>
-                  <a:tcPr marL="0" marR="0" marT="0" marB="1" vert="horz" anchor="t">
-                    <a:lnL w="12700">
-                      <a:solidFill>
-                        <a:schemeClr val="tx1"/>
-                      </a:solidFill>
-                      <a:prstDash val="solid"/>
-                    </a:lnL>
-                    <a:lnR w="12700">
-                      <a:solidFill>
-                        <a:schemeClr val="tx1"/>
-                      </a:solidFill>
-                      <a:prstDash val="solid"/>
-                    </a:lnR>
-                    <a:lnT w="12700">
-                      <a:solidFill>
-                        <a:schemeClr val="tx1"/>
-                      </a:solidFill>
-                      <a:prstDash val="solid"/>
-                    </a:lnT>
-                    <a:lnB w="12700">
-                      <a:solidFill>
-                        <a:schemeClr val="tx1"/>
-                      </a:solidFill>
-                      <a:prstDash val="solid"/>
-                    </a:lnB>
-                    <a:lnTlToBr>
-                      <a:noFill/>
-                    </a:lnTlToBr>
-                    <a:lnBlToTr>
-                      <a:noFill/>
-                    </a:lnBlToTr>
-                    <a:noFill/>
-                  </a:tcPr>
-                </a:tc>
-                <a:tc>
-                  <a:txBody>
-                    <a:bodyPr/>
-                    <a:p>
-                      <a:pPr marL="0" indent="0" algn="ctr">
-                        <a:buNone/>
-                      </a:pPr>
-                      <a:r>
-                        <a:rPr sz="1600" b="0" u="none">
-                          <a:latin typeface="Ubuntu Mono" charset="0"/>
-                          <a:ea typeface="Ubuntu Mono" charset="0"/>
-                          <a:cs typeface="Ubuntu Mono" charset="0"/>
-                        </a:rPr>
-                        <a:t>clk period</a:t>
-                      </a:r>
-                      <a:endParaRPr sz="1600" b="0" u="none">
-                        <a:latin typeface="Ubuntu Mono" charset="0"/>
-                        <a:ea typeface="Ubuntu Mono" charset="0"/>
-                        <a:cs typeface="Ubuntu Mono" charset="0"/>
-                      </a:endParaRPr>
-                    </a:p>
-                  </a:txBody>
-                  <a:tcPr marL="0" marR="0" marT="0" marB="1" vert="horz" anchor="t">
-                    <a:lnL w="12700">
-                      <a:solidFill>
-                        <a:schemeClr val="tx1"/>
-                      </a:solidFill>
-                      <a:prstDash val="solid"/>
-                    </a:lnL>
-                    <a:lnR w="12700">
-                      <a:solidFill>
-                        <a:schemeClr val="tx1"/>
-                      </a:solidFill>
-                      <a:prstDash val="solid"/>
-                    </a:lnR>
-                    <a:lnT w="12700">
-                      <a:solidFill>
-                        <a:schemeClr val="tx1"/>
-                      </a:solidFill>
-                      <a:prstDash val="solid"/>
-                    </a:lnT>
-                    <a:lnB w="12700">
-                      <a:solidFill>
-                        <a:schemeClr val="tx1"/>
-                      </a:solidFill>
-                      <a:prstDash val="solid"/>
-                    </a:lnB>
-                    <a:lnTlToBr>
-                      <a:noFill/>
-                    </a:lnTlToBr>
-                    <a:lnBlToTr>
-                      <a:noFill/>
-                    </a:lnBlToTr>
-                    <a:noFill/>
-                  </a:tcPr>
-                </a:tc>
-              </a:tr>
-              <a:tr h="266700">
-                <a:tc>
-                  <a:txBody>
-                    <a:bodyPr/>
-                    <a:p>
-                      <a:pPr marL="0" indent="0" algn="ctr">
-                        <a:buNone/>
-                      </a:pPr>
-                      <a:r>
-                        <a:rPr sz="1600" b="0" u="none">
-                          <a:latin typeface="Ubuntu Mono" charset="0"/>
-                          <a:ea typeface="Ubuntu Mono" charset="0"/>
-                          <a:cs typeface="Ubuntu Mono" charset="0"/>
-                        </a:rPr>
-                        <a:t>Key-Gen</a:t>
-                      </a:r>
-                      <a:endParaRPr sz="1600" b="0" u="none">
-                        <a:latin typeface="Ubuntu Mono" charset="0"/>
-                        <a:ea typeface="Ubuntu Mono" charset="0"/>
-                        <a:cs typeface="Ubuntu Mono" charset="0"/>
-                      </a:endParaRPr>
-                    </a:p>
-                  </a:txBody>
-                  <a:tcPr marL="0" marR="0" marT="0" marB="1" vert="horz" anchor="t">
-                    <a:lnL w="12700">
-                      <a:solidFill>
-                        <a:schemeClr val="tx1"/>
-                      </a:solidFill>
-                      <a:prstDash val="solid"/>
-                    </a:lnL>
-                    <a:lnR w="12700">
-                      <a:solidFill>
-                        <a:schemeClr val="tx1"/>
-                      </a:solidFill>
-                      <a:prstDash val="solid"/>
-                    </a:lnR>
-                    <a:lnT w="12700">
-                      <a:solidFill>
-                        <a:schemeClr val="tx1"/>
-                      </a:solidFill>
-                      <a:prstDash val="solid"/>
-                    </a:lnT>
-                    <a:lnB w="12700">
-                      <a:solidFill>
-                        <a:schemeClr val="tx1"/>
-                      </a:solidFill>
-                      <a:prstDash val="solid"/>
-                    </a:lnB>
-                    <a:lnTlToBr>
-                      <a:noFill/>
-                    </a:lnTlToBr>
-                    <a:lnBlToTr>
-                      <a:noFill/>
-                    </a:lnBlToTr>
-                    <a:noFill/>
-                  </a:tcPr>
-                </a:tc>
-                <a:tc>
-                  <a:txBody>
-                    <a:bodyPr/>
-                    <a:p>
-                      <a:pPr marL="0" indent="0" algn="ctr">
-                        <a:buNone/>
-                      </a:pPr>
-                      <a:r>
-                        <a:rPr sz="1600" b="0" u="none">
-                          <a:latin typeface="Ubuntu Mono" charset="0"/>
-                          <a:ea typeface="Ubuntu Mono" charset="0"/>
-                          <a:cs typeface="Ubuntu Mono" charset="0"/>
-                        </a:rPr>
-                        <a:t>10460</a:t>
-                      </a:r>
-                      <a:endParaRPr sz="1600" b="0" u="none">
-                        <a:latin typeface="Ubuntu Mono" charset="0"/>
-                        <a:ea typeface="Ubuntu Mono" charset="0"/>
-                        <a:cs typeface="Ubuntu Mono" charset="0"/>
-                      </a:endParaRPr>
-                    </a:p>
-                  </a:txBody>
-                  <a:tcPr marL="0" marR="0" marT="0" marB="1" vert="horz" anchor="t">
-                    <a:lnL w="12700">
-                      <a:solidFill>
-                        <a:schemeClr val="tx1"/>
-                      </a:solidFill>
-                      <a:prstDash val="solid"/>
-                    </a:lnL>
-                    <a:lnR w="12700">
-                      <a:solidFill>
-                        <a:schemeClr val="tx1"/>
-                      </a:solidFill>
-                      <a:prstDash val="solid"/>
-                    </a:lnR>
-                    <a:lnT w="12700">
-                      <a:solidFill>
-                        <a:schemeClr val="tx1"/>
-                      </a:solidFill>
-                      <a:prstDash val="solid"/>
-                    </a:lnT>
-                    <a:lnB w="12700">
-                      <a:solidFill>
-                        <a:schemeClr val="tx1"/>
-                      </a:solidFill>
-                      <a:prstDash val="solid"/>
-                    </a:lnB>
-                    <a:lnTlToBr>
-                      <a:noFill/>
-                    </a:lnTlToBr>
-                    <a:lnBlToTr>
-                      <a:noFill/>
-                    </a:lnBlToTr>
-                    <a:noFill/>
-                  </a:tcPr>
-                </a:tc>
-                <a:tc>
-                  <a:txBody>
-                    <a:bodyPr/>
-                    <a:p>
-                      <a:pPr marL="0" indent="0" algn="ctr">
-                        <a:buNone/>
-                      </a:pPr>
-                      <a:r>
-                        <a:rPr sz="1600" b="0" u="none">
-                          <a:latin typeface="Ubuntu Mono" charset="0"/>
-                          <a:ea typeface="Ubuntu Mono" charset="0"/>
-                          <a:cs typeface="Ubuntu Mono" charset="0"/>
-                        </a:rPr>
-                        <a:t>495860</a:t>
-                      </a:r>
-                      <a:endParaRPr sz="1600" b="0" u="none">
-                        <a:latin typeface="Ubuntu Mono" charset="0"/>
-                        <a:ea typeface="Ubuntu Mono" charset="0"/>
-                        <a:cs typeface="Ubuntu Mono" charset="0"/>
-                      </a:endParaRPr>
-                    </a:p>
-                  </a:txBody>
-                  <a:tcPr marL="0" marR="0" marT="0" marB="1" vert="horz" anchor="t">
-                    <a:lnL w="12700">
-                      <a:solidFill>
-                        <a:schemeClr val="tx1"/>
-                      </a:solidFill>
-                      <a:prstDash val="solid"/>
-                    </a:lnL>
-                    <a:lnR w="12700">
-                      <a:solidFill>
-                        <a:schemeClr val="tx1"/>
-                      </a:solidFill>
-                      <a:prstDash val="solid"/>
-                    </a:lnR>
-                    <a:lnT w="12700">
-                      <a:solidFill>
-                        <a:schemeClr val="tx1"/>
-                      </a:solidFill>
-                      <a:prstDash val="solid"/>
-                    </a:lnT>
-                    <a:lnB w="12700">
-                      <a:solidFill>
-                        <a:schemeClr val="tx1"/>
-                      </a:solidFill>
-                      <a:prstDash val="solid"/>
-                    </a:lnB>
-                    <a:lnTlToBr>
-                      <a:noFill/>
-                    </a:lnTlToBr>
-                    <a:lnBlToTr>
-                      <a:noFill/>
-                    </a:lnBlToTr>
-                    <a:noFill/>
-                  </a:tcPr>
-                </a:tc>
-                <a:tc>
-                  <a:txBody>
-                    <a:bodyPr/>
-                    <a:p>
-                      <a:pPr marL="0" indent="0" algn="ctr">
-                        <a:buNone/>
-                      </a:pPr>
-                      <a:r>
-                        <a:rPr sz="1600" b="0" u="none">
-                          <a:latin typeface="Ubuntu Mono" charset="0"/>
-                          <a:ea typeface="Ubuntu Mono" charset="0"/>
-                          <a:cs typeface="Ubuntu Mono" charset="0"/>
-                        </a:rPr>
-                        <a:t>485400</a:t>
-                      </a:r>
-                      <a:endParaRPr sz="1600" b="0" u="none">
-                        <a:latin typeface="Ubuntu Mono" charset="0"/>
-                        <a:ea typeface="Ubuntu Mono" charset="0"/>
-                        <a:cs typeface="Ubuntu Mono" charset="0"/>
-                      </a:endParaRPr>
-                    </a:p>
-                  </a:txBody>
-                  <a:tcPr marL="0" marR="0" marT="0" marB="1" vert="horz" anchor="t">
-                    <a:lnL w="12700">
-                      <a:solidFill>
-                        <a:schemeClr val="tx1"/>
-                      </a:solidFill>
-                      <a:prstDash val="solid"/>
-                    </a:lnL>
-                    <a:lnR w="12700">
-                      <a:solidFill>
-                        <a:schemeClr val="tx1"/>
-                      </a:solidFill>
-                      <a:prstDash val="solid"/>
-                    </a:lnR>
-                    <a:lnT w="12700">
-                      <a:solidFill>
-                        <a:schemeClr val="tx1"/>
-                      </a:solidFill>
-                      <a:prstDash val="solid"/>
-                    </a:lnT>
-                    <a:lnB w="12700">
-                      <a:solidFill>
-                        <a:schemeClr val="tx1"/>
-                      </a:solidFill>
-                      <a:prstDash val="solid"/>
-                    </a:lnB>
-                    <a:lnTlToBr>
-                      <a:noFill/>
-                    </a:lnTlToBr>
-                    <a:lnBlToTr>
-                      <a:noFill/>
-                    </a:lnBlToTr>
-                    <a:noFill/>
-                  </a:tcPr>
-                </a:tc>
-                <a:tc>
-                  <a:txBody>
-                    <a:bodyPr/>
-                    <a:p>
-                      <a:pPr marL="0" indent="0" algn="ctr">
-                        <a:buNone/>
-                      </a:pPr>
-                      <a:r>
-                        <a:rPr sz="1600" b="0" u="none">
-                          <a:solidFill>
-                            <a:srgbClr val="FF0000"/>
-                          </a:solidFill>
-                          <a:latin typeface="Ubuntu Mono" charset="0"/>
-                          <a:ea typeface="Ubuntu Mono" charset="0"/>
-                          <a:cs typeface="Ubuntu Mono" charset="0"/>
-                        </a:rPr>
-                        <a:t>12135</a:t>
-                      </a:r>
-                      <a:endParaRPr sz="1600" b="0" u="none">
-                        <a:solidFill>
-                          <a:srgbClr val="FF0000"/>
-                        </a:solidFill>
-                        <a:latin typeface="Ubuntu Mono" charset="0"/>
-                        <a:ea typeface="Ubuntu Mono" charset="0"/>
-                        <a:cs typeface="Ubuntu Mono" charset="0"/>
-                      </a:endParaRPr>
-                    </a:p>
-                  </a:txBody>
-                  <a:tcPr marL="0" marR="0" marT="0" marB="1" vert="horz" anchor="t">
-                    <a:lnL w="12700">
-                      <a:solidFill>
-                        <a:schemeClr val="tx1"/>
-                      </a:solidFill>
-                      <a:prstDash val="solid"/>
-                    </a:lnL>
-                    <a:lnR w="12700">
-                      <a:solidFill>
-                        <a:schemeClr val="tx1"/>
-                      </a:solidFill>
-                      <a:prstDash val="solid"/>
-                    </a:lnR>
-                    <a:lnT w="12700">
-                      <a:solidFill>
-                        <a:schemeClr val="tx1"/>
-                      </a:solidFill>
-                      <a:prstDash val="solid"/>
-                    </a:lnT>
-                    <a:lnB w="12700">
-                      <a:solidFill>
-                        <a:schemeClr val="tx1"/>
-                      </a:solidFill>
-                      <a:prstDash val="solid"/>
-                    </a:lnB>
-                    <a:lnTlToBr>
-                      <a:noFill/>
-                    </a:lnTlToBr>
-                    <a:lnBlToTr>
-                      <a:noFill/>
-                    </a:lnBlToTr>
-                    <a:noFill/>
-                  </a:tcPr>
-                </a:tc>
-                <a:tc rowSpan="3">
-                  <a:txBody>
-                    <a:bodyPr/>
-                    <a:p>
-                      <a:pPr marL="0" indent="0" algn="ctr">
-                        <a:buNone/>
-                      </a:pPr>
-                      <a:r>
-                        <a:rPr sz="1600" b="0" u="none">
-                          <a:latin typeface="Ubuntu Mono" charset="0"/>
-                          <a:ea typeface="Ubuntu Mono" charset="0"/>
-                          <a:cs typeface="Ubuntu Mono" charset="0"/>
-                        </a:rPr>
-                        <a:t>40</a:t>
-                      </a:r>
-                      <a:endParaRPr sz="1600" b="0" u="none">
-                        <a:latin typeface="Ubuntu Mono" charset="0"/>
-                        <a:ea typeface="Ubuntu Mono" charset="0"/>
-                        <a:cs typeface="Ubuntu Mono" charset="0"/>
-                      </a:endParaRPr>
-                    </a:p>
-                  </a:txBody>
-                  <a:tcPr marL="0" marR="0" marT="0" marB="1" vert="horz" anchor="t">
-                    <a:lnL w="12700">
-                      <a:solidFill>
-                        <a:schemeClr val="tx1"/>
-                      </a:solidFill>
-                      <a:prstDash val="solid"/>
-                    </a:lnL>
-                    <a:lnR w="12700">
-                      <a:solidFill>
-                        <a:schemeClr val="tx1"/>
-                      </a:solidFill>
-                      <a:prstDash val="solid"/>
-                    </a:lnR>
-                    <a:lnT w="12700">
-                      <a:solidFill>
-                        <a:schemeClr val="tx1"/>
-                      </a:solidFill>
-                      <a:prstDash val="solid"/>
-                    </a:lnT>
-                    <a:lnB w="12700">
-                      <a:solidFill>
-                        <a:schemeClr val="tx1"/>
-                      </a:solidFill>
-                      <a:prstDash val="solid"/>
-                    </a:lnB>
-                    <a:lnTlToBr>
-                      <a:noFill/>
-                    </a:lnTlToBr>
-                    <a:lnBlToTr>
-                      <a:noFill/>
-                    </a:lnBlToTr>
-                    <a:noFill/>
-                  </a:tcPr>
-                </a:tc>
-              </a:tr>
-              <a:tr h="266700">
-                <a:tc>
-                  <a:txBody>
-                    <a:bodyPr/>
-                    <a:p>
-                      <a:pPr marL="0" indent="0" algn="ctr">
-                        <a:buNone/>
-                      </a:pPr>
-                      <a:r>
-                        <a:rPr sz="1600" b="0" u="none">
-                          <a:latin typeface="Ubuntu Mono" charset="0"/>
-                          <a:ea typeface="Ubuntu Mono" charset="0"/>
-                          <a:cs typeface="Ubuntu Mono" charset="0"/>
-                        </a:rPr>
-                        <a:t>Encryption</a:t>
-                      </a:r>
-                      <a:endParaRPr sz="1600" b="0" u="none">
-                        <a:latin typeface="Ubuntu Mono" charset="0"/>
-                        <a:ea typeface="Ubuntu Mono" charset="0"/>
-                        <a:cs typeface="Ubuntu Mono" charset="0"/>
-                      </a:endParaRPr>
-                    </a:p>
-                  </a:txBody>
-                  <a:tcPr marL="0" marR="0" marT="0" marB="1" vert="horz" anchor="t">
-                    <a:lnL w="12700">
-                      <a:solidFill>
-                        <a:schemeClr val="tx1"/>
-                      </a:solidFill>
-                      <a:prstDash val="solid"/>
-                    </a:lnL>
-                    <a:lnR w="12700">
-                      <a:solidFill>
-                        <a:schemeClr val="tx1"/>
-                      </a:solidFill>
-                      <a:prstDash val="solid"/>
-                    </a:lnR>
-                    <a:lnT w="12700">
-                      <a:solidFill>
-                        <a:schemeClr val="tx1"/>
-                      </a:solidFill>
-                      <a:prstDash val="solid"/>
-                    </a:lnT>
-                    <a:lnB w="12700">
-                      <a:solidFill>
-                        <a:schemeClr val="tx1"/>
-                      </a:solidFill>
-                      <a:prstDash val="solid"/>
-                    </a:lnB>
-                    <a:lnTlToBr>
-                      <a:noFill/>
-                    </a:lnTlToBr>
-                    <a:lnBlToTr>
-                      <a:noFill/>
-                    </a:lnBlToTr>
-                    <a:noFill/>
-                  </a:tcPr>
-                </a:tc>
-                <a:tc>
-                  <a:txBody>
-                    <a:bodyPr/>
-                    <a:p>
-                      <a:pPr marL="0" indent="0" algn="ctr">
-                        <a:buNone/>
-                      </a:pPr>
-                      <a:r>
-                        <a:rPr sz="1600" b="0" u="none">
-                          <a:latin typeface="Ubuntu Mono" charset="0"/>
-                          <a:ea typeface="Ubuntu Mono" charset="0"/>
-                          <a:cs typeface="Ubuntu Mono" charset="0"/>
-                        </a:rPr>
-                        <a:t>495860</a:t>
-                      </a:r>
-                      <a:endParaRPr sz="1600" b="0" u="none">
-                        <a:latin typeface="Ubuntu Mono" charset="0"/>
-                        <a:ea typeface="Ubuntu Mono" charset="0"/>
-                        <a:cs typeface="Ubuntu Mono" charset="0"/>
-                      </a:endParaRPr>
-                    </a:p>
-                  </a:txBody>
-                  <a:tcPr marL="0" marR="0" marT="0" marB="1" vert="horz" anchor="t">
-                    <a:lnL w="12700">
-                      <a:solidFill>
-                        <a:schemeClr val="tx1"/>
-                      </a:solidFill>
-                      <a:prstDash val="solid"/>
-                    </a:lnL>
-                    <a:lnR w="12700">
-                      <a:solidFill>
-                        <a:schemeClr val="tx1"/>
-                      </a:solidFill>
-                      <a:prstDash val="solid"/>
-                    </a:lnR>
-                    <a:lnT w="12700">
-                      <a:solidFill>
-                        <a:schemeClr val="tx1"/>
-                      </a:solidFill>
-                      <a:prstDash val="solid"/>
-                    </a:lnT>
-                    <a:lnB w="12700">
-                      <a:solidFill>
-                        <a:schemeClr val="tx1"/>
-                      </a:solidFill>
-                      <a:prstDash val="solid"/>
-                    </a:lnB>
-                    <a:lnTlToBr>
-                      <a:noFill/>
-                    </a:lnTlToBr>
-                    <a:lnBlToTr>
-                      <a:noFill/>
-                    </a:lnBlToTr>
-                    <a:noFill/>
-                  </a:tcPr>
-                </a:tc>
-                <a:tc>
-                  <a:txBody>
-                    <a:bodyPr/>
-                    <a:p>
-                      <a:pPr marL="0" indent="0" algn="ctr">
-                        <a:buNone/>
-                      </a:pPr>
-                      <a:r>
-                        <a:rPr sz="1600" b="0" u="none">
-                          <a:latin typeface="Ubuntu Mono" charset="0"/>
-                          <a:ea typeface="Ubuntu Mono" charset="0"/>
-                          <a:cs typeface="Ubuntu Mono" charset="0"/>
-                        </a:rPr>
-                        <a:t>639260</a:t>
-                      </a:r>
-                      <a:endParaRPr sz="1600" b="0" u="none">
-                        <a:latin typeface="Ubuntu Mono" charset="0"/>
-                        <a:ea typeface="Ubuntu Mono" charset="0"/>
-                        <a:cs typeface="Ubuntu Mono" charset="0"/>
-                      </a:endParaRPr>
-                    </a:p>
-                  </a:txBody>
-                  <a:tcPr marL="0" marR="0" marT="0" marB="1" vert="horz" anchor="t">
-                    <a:lnL w="12700">
-                      <a:solidFill>
-                        <a:schemeClr val="tx1"/>
-                      </a:solidFill>
-                      <a:prstDash val="solid"/>
-                    </a:lnL>
-                    <a:lnR w="12700">
-                      <a:solidFill>
-                        <a:schemeClr val="tx1"/>
-                      </a:solidFill>
-                      <a:prstDash val="solid"/>
-                    </a:lnR>
-                    <a:lnT w="12700">
-                      <a:solidFill>
-                        <a:schemeClr val="tx1"/>
-                      </a:solidFill>
-                      <a:prstDash val="solid"/>
-                    </a:lnT>
-                    <a:lnB w="12700">
-                      <a:solidFill>
-                        <a:schemeClr val="tx1"/>
-                      </a:solidFill>
-                      <a:prstDash val="solid"/>
-                    </a:lnB>
-                    <a:lnTlToBr>
-                      <a:noFill/>
-                    </a:lnTlToBr>
-                    <a:lnBlToTr>
-                      <a:noFill/>
-                    </a:lnBlToTr>
-                    <a:noFill/>
-                  </a:tcPr>
-                </a:tc>
-                <a:tc>
-                  <a:txBody>
-                    <a:bodyPr/>
-                    <a:p>
-                      <a:pPr marL="0" indent="0" algn="ctr">
-                        <a:buNone/>
-                      </a:pPr>
-                      <a:r>
-                        <a:rPr sz="1600" b="0" u="none">
-                          <a:latin typeface="Ubuntu Mono" charset="0"/>
-                          <a:ea typeface="Ubuntu Mono" charset="0"/>
-                          <a:cs typeface="Ubuntu Mono" charset="0"/>
-                        </a:rPr>
-                        <a:t>143400</a:t>
-                      </a:r>
-                      <a:endParaRPr sz="1600" b="0" u="none">
-                        <a:latin typeface="Ubuntu Mono" charset="0"/>
-                        <a:ea typeface="Ubuntu Mono" charset="0"/>
-                        <a:cs typeface="Ubuntu Mono" charset="0"/>
-                      </a:endParaRPr>
-                    </a:p>
-                  </a:txBody>
-                  <a:tcPr marL="0" marR="0" marT="0" marB="1" vert="horz" anchor="t">
-                    <a:lnL w="12700">
-                      <a:solidFill>
-                        <a:schemeClr val="tx1"/>
-                      </a:solidFill>
-                      <a:prstDash val="solid"/>
-                    </a:lnL>
-                    <a:lnR w="12700">
-                      <a:solidFill>
-                        <a:schemeClr val="tx1"/>
-                      </a:solidFill>
-                      <a:prstDash val="solid"/>
-                    </a:lnR>
-                    <a:lnT w="12700">
-                      <a:solidFill>
-                        <a:schemeClr val="tx1"/>
-                      </a:solidFill>
-                      <a:prstDash val="solid"/>
-                    </a:lnT>
-                    <a:lnB w="12700">
-                      <a:solidFill>
-                        <a:schemeClr val="tx1"/>
-                      </a:solidFill>
-                      <a:prstDash val="solid"/>
-                    </a:lnB>
-                    <a:lnTlToBr>
-                      <a:noFill/>
-                    </a:lnTlToBr>
-                    <a:lnBlToTr>
-                      <a:noFill/>
-                    </a:lnBlToTr>
-                    <a:noFill/>
-                  </a:tcPr>
-                </a:tc>
-                <a:tc>
-                  <a:txBody>
-                    <a:bodyPr/>
-                    <a:p>
-                      <a:pPr marL="0" indent="0" algn="ctr">
-                        <a:buNone/>
-                      </a:pPr>
-                      <a:r>
-                        <a:rPr sz="1600" b="0" u="none">
-                          <a:solidFill>
-                            <a:srgbClr val="FF0000"/>
-                          </a:solidFill>
-                          <a:latin typeface="Ubuntu Mono" charset="0"/>
-                          <a:ea typeface="Ubuntu Mono" charset="0"/>
-                          <a:cs typeface="Ubuntu Mono" charset="0"/>
-                        </a:rPr>
-                        <a:t>3585</a:t>
-                      </a:r>
-                      <a:endParaRPr sz="1600" b="0" u="none">
-                        <a:solidFill>
-                          <a:srgbClr val="FF0000"/>
-                        </a:solidFill>
-                        <a:latin typeface="Ubuntu Mono" charset="0"/>
-                        <a:ea typeface="Ubuntu Mono" charset="0"/>
-                        <a:cs typeface="Ubuntu Mono" charset="0"/>
-                      </a:endParaRPr>
-                    </a:p>
-                  </a:txBody>
-                  <a:tcPr marL="0" marR="0" marT="0" marB="1" vert="horz" anchor="t">
-                    <a:lnL w="12700">
-                      <a:solidFill>
-                        <a:schemeClr val="tx1"/>
-                      </a:solidFill>
-                      <a:prstDash val="solid"/>
-                    </a:lnL>
-                    <a:lnR w="12700">
-                      <a:solidFill>
-                        <a:schemeClr val="tx1"/>
-                      </a:solidFill>
-                      <a:prstDash val="solid"/>
-                    </a:lnR>
-                    <a:lnT w="12700">
-                      <a:solidFill>
-                        <a:schemeClr val="tx1"/>
-                      </a:solidFill>
-                      <a:prstDash val="solid"/>
-                    </a:lnT>
-                    <a:lnB w="12700">
-                      <a:solidFill>
-                        <a:schemeClr val="tx1"/>
-                      </a:solidFill>
-                      <a:prstDash val="solid"/>
-                    </a:lnB>
-                    <a:lnTlToBr>
-                      <a:noFill/>
-                    </a:lnTlToBr>
-                    <a:lnBlToTr>
-                      <a:noFill/>
-                    </a:lnBlToTr>
-                    <a:noFill/>
-                  </a:tcPr>
-                </a:tc>
-                <a:tc vMerge="1">
-                  <a:tcPr>
-                    <a:lnL w="12700">
-                      <a:solidFill>
-                        <a:schemeClr val="tx1"/>
-                      </a:solidFill>
-                      <a:prstDash val="solid"/>
-                    </a:lnL>
-                    <a:lnR w="12700">
-                      <a:solidFill>
-                        <a:schemeClr val="tx1"/>
-                      </a:solidFill>
-                      <a:prstDash val="solid"/>
-                    </a:lnR>
-                  </a:tcPr>
-                </a:tc>
-              </a:tr>
-              <a:tr h="266700">
-                <a:tc>
-                  <a:txBody>
-                    <a:bodyPr/>
-                    <a:p>
-                      <a:pPr marL="0" indent="0" algn="ctr">
-                        <a:buNone/>
-                      </a:pPr>
-                      <a:r>
-                        <a:rPr sz="1600" b="0" u="none">
-                          <a:latin typeface="Ubuntu Mono" charset="0"/>
-                          <a:ea typeface="Ubuntu Mono" charset="0"/>
-                          <a:cs typeface="Ubuntu Mono" charset="0"/>
-                        </a:rPr>
-                        <a:t>Decryption</a:t>
-                      </a:r>
-                      <a:endParaRPr sz="1600" b="0" u="none">
-                        <a:latin typeface="Ubuntu Mono" charset="0"/>
-                        <a:ea typeface="Ubuntu Mono" charset="0"/>
-                        <a:cs typeface="Ubuntu Mono" charset="0"/>
-                      </a:endParaRPr>
-                    </a:p>
-                  </a:txBody>
-                  <a:tcPr marL="0" marR="0" marT="0" marB="1" vert="horz" anchor="t">
-                    <a:lnL w="12700">
-                      <a:solidFill>
-                        <a:schemeClr val="tx1"/>
-                      </a:solidFill>
-                      <a:prstDash val="solid"/>
-                    </a:lnL>
-                    <a:lnR w="12700">
-                      <a:solidFill>
-                        <a:schemeClr val="tx1"/>
-                      </a:solidFill>
-                      <a:prstDash val="solid"/>
-                    </a:lnR>
-                    <a:lnT w="12700">
-                      <a:solidFill>
-                        <a:schemeClr val="tx1"/>
-                      </a:solidFill>
-                      <a:prstDash val="solid"/>
-                    </a:lnT>
-                    <a:lnB w="12700">
-                      <a:solidFill>
-                        <a:schemeClr val="tx1"/>
-                      </a:solidFill>
-                      <a:prstDash val="solid"/>
-                    </a:lnB>
-                    <a:lnTlToBr>
-                      <a:noFill/>
-                    </a:lnTlToBr>
-                    <a:lnBlToTr>
-                      <a:noFill/>
-                    </a:lnBlToTr>
-                    <a:noFill/>
-                  </a:tcPr>
-                </a:tc>
-                <a:tc>
-                  <a:txBody>
-                    <a:bodyPr/>
-                    <a:p>
-                      <a:pPr marL="0" indent="0" algn="ctr">
-                        <a:buNone/>
-                      </a:pPr>
-                      <a:r>
-                        <a:rPr sz="1600" b="0" u="none">
-                          <a:latin typeface="Ubuntu Mono" charset="0"/>
-                          <a:ea typeface="Ubuntu Mono" charset="0"/>
-                          <a:cs typeface="Ubuntu Mono" charset="0"/>
-                        </a:rPr>
-                        <a:t>639260</a:t>
-                      </a:r>
-                      <a:endParaRPr sz="1600" b="0" u="none">
-                        <a:latin typeface="Ubuntu Mono" charset="0"/>
-                        <a:ea typeface="Ubuntu Mono" charset="0"/>
-                        <a:cs typeface="Ubuntu Mono" charset="0"/>
-                      </a:endParaRPr>
-                    </a:p>
-                  </a:txBody>
-                  <a:tcPr marL="0" marR="0" marT="0" marB="1" vert="horz" anchor="t">
-                    <a:lnL w="12700">
-                      <a:solidFill>
-                        <a:schemeClr val="tx1"/>
-                      </a:solidFill>
-                      <a:prstDash val="solid"/>
-                    </a:lnL>
-                    <a:lnR w="12700">
-                      <a:solidFill>
-                        <a:schemeClr val="tx1"/>
-                      </a:solidFill>
-                      <a:prstDash val="solid"/>
-                    </a:lnR>
-                    <a:lnT w="12700">
-                      <a:solidFill>
-                        <a:schemeClr val="tx1"/>
-                      </a:solidFill>
-                      <a:prstDash val="solid"/>
-                    </a:lnT>
-                    <a:lnB w="12700">
-                      <a:solidFill>
-                        <a:schemeClr val="tx1"/>
-                      </a:solidFill>
-                      <a:prstDash val="solid"/>
-                    </a:lnB>
-                    <a:lnTlToBr>
-                      <a:noFill/>
-                    </a:lnTlToBr>
-                    <a:lnBlToTr>
-                      <a:noFill/>
-                    </a:lnBlToTr>
-                    <a:noFill/>
-                  </a:tcPr>
-                </a:tc>
-                <a:tc>
-                  <a:txBody>
-                    <a:bodyPr/>
-                    <a:p>
-                      <a:pPr marL="0" indent="0" algn="ctr">
-                        <a:buNone/>
-                      </a:pPr>
-                      <a:r>
-                        <a:rPr sz="1600" b="0" u="none">
-                          <a:latin typeface="Ubuntu Mono" charset="0"/>
-                          <a:ea typeface="Ubuntu Mono" charset="0"/>
-                          <a:cs typeface="Ubuntu Mono" charset="0"/>
-                        </a:rPr>
-                        <a:t>782700</a:t>
-                      </a:r>
-                      <a:endParaRPr sz="1600" b="0" u="none">
-                        <a:latin typeface="Ubuntu Mono" charset="0"/>
-                        <a:ea typeface="Ubuntu Mono" charset="0"/>
-                        <a:cs typeface="Ubuntu Mono" charset="0"/>
-                      </a:endParaRPr>
-                    </a:p>
-                  </a:txBody>
-                  <a:tcPr marL="0" marR="0" marT="0" marB="1" vert="horz" anchor="t">
-                    <a:lnL w="12700">
-                      <a:solidFill>
-                        <a:schemeClr val="tx1"/>
-                      </a:solidFill>
-                      <a:prstDash val="solid"/>
-                    </a:lnL>
-                    <a:lnR w="12700">
-                      <a:solidFill>
-                        <a:schemeClr val="tx1"/>
-                      </a:solidFill>
-                      <a:prstDash val="solid"/>
-                    </a:lnR>
-                    <a:lnT w="12700">
-                      <a:solidFill>
-                        <a:schemeClr val="tx1"/>
-                      </a:solidFill>
-                      <a:prstDash val="solid"/>
-                    </a:lnT>
-                    <a:lnB w="12700">
-                      <a:solidFill>
-                        <a:schemeClr val="tx1"/>
-                      </a:solidFill>
-                      <a:prstDash val="solid"/>
-                    </a:lnB>
-                    <a:lnTlToBr>
-                      <a:noFill/>
-                    </a:lnTlToBr>
-                    <a:lnBlToTr>
-                      <a:noFill/>
-                    </a:lnBlToTr>
-                    <a:noFill/>
-                  </a:tcPr>
-                </a:tc>
-                <a:tc>
-                  <a:txBody>
-                    <a:bodyPr/>
-                    <a:p>
-                      <a:pPr marL="0" indent="0" algn="ctr">
-                        <a:buNone/>
-                      </a:pPr>
-                      <a:r>
-                        <a:rPr sz="1600" b="0" u="none">
-                          <a:latin typeface="Ubuntu Mono" charset="0"/>
-                          <a:ea typeface="Ubuntu Mono" charset="0"/>
-                          <a:cs typeface="Ubuntu Mono" charset="0"/>
-                        </a:rPr>
-                        <a:t>143440</a:t>
-                      </a:r>
-                      <a:endParaRPr sz="1600" b="0" u="none">
-                        <a:latin typeface="Ubuntu Mono" charset="0"/>
-                        <a:ea typeface="Ubuntu Mono" charset="0"/>
-                        <a:cs typeface="Ubuntu Mono" charset="0"/>
-                      </a:endParaRPr>
-                    </a:p>
-                  </a:txBody>
-                  <a:tcPr marL="0" marR="0" marT="0" marB="1" vert="horz" anchor="t">
-                    <a:lnL w="12700">
-                      <a:solidFill>
-                        <a:schemeClr val="tx1"/>
-                      </a:solidFill>
-                      <a:prstDash val="solid"/>
-                    </a:lnL>
-                    <a:lnR w="12700">
-                      <a:solidFill>
-                        <a:schemeClr val="tx1"/>
-                      </a:solidFill>
-                      <a:prstDash val="solid"/>
-                    </a:lnR>
-                    <a:lnT w="12700">
-                      <a:solidFill>
-                        <a:schemeClr val="tx1"/>
-                      </a:solidFill>
-                      <a:prstDash val="solid"/>
-                    </a:lnT>
-                    <a:lnB w="12700">
-                      <a:solidFill>
-                        <a:schemeClr val="tx1"/>
-                      </a:solidFill>
-                      <a:prstDash val="solid"/>
-                    </a:lnB>
-                    <a:lnTlToBr>
-                      <a:noFill/>
-                    </a:lnTlToBr>
-                    <a:lnBlToTr>
-                      <a:noFill/>
-                    </a:lnBlToTr>
-                    <a:noFill/>
-                  </a:tcPr>
-                </a:tc>
-                <a:tc>
-                  <a:txBody>
-                    <a:bodyPr/>
-                    <a:p>
-                      <a:pPr marL="0" indent="0" algn="ctr">
-                        <a:buNone/>
-                      </a:pPr>
-                      <a:r>
-                        <a:rPr sz="1600" b="0" u="none">
-                          <a:solidFill>
-                            <a:srgbClr val="FF0000"/>
-                          </a:solidFill>
-                          <a:latin typeface="Ubuntu Mono" charset="0"/>
-                          <a:ea typeface="Ubuntu Mono" charset="0"/>
-                          <a:cs typeface="Ubuntu Mono" charset="0"/>
-                        </a:rPr>
-                        <a:t>3586</a:t>
-                      </a:r>
-                      <a:endParaRPr sz="1600" b="0" u="none">
-                        <a:solidFill>
-                          <a:srgbClr val="FF0000"/>
-                        </a:solidFill>
-                        <a:latin typeface="Ubuntu Mono" charset="0"/>
-                        <a:ea typeface="Ubuntu Mono" charset="0"/>
-                        <a:cs typeface="Ubuntu Mono" charset="0"/>
-                      </a:endParaRPr>
-                    </a:p>
-                  </a:txBody>
-                  <a:tcPr marL="0" marR="0" marT="0" marB="1" vert="horz" anchor="t">
-                    <a:lnL w="12700">
-                      <a:solidFill>
-                        <a:schemeClr val="tx1"/>
-                      </a:solidFill>
-                      <a:prstDash val="solid"/>
-                    </a:lnL>
-                    <a:lnR w="12700">
-                      <a:solidFill>
-                        <a:schemeClr val="tx1"/>
-                      </a:solidFill>
-                      <a:prstDash val="solid"/>
-                    </a:lnR>
-                    <a:lnT w="12700">
-                      <a:solidFill>
-                        <a:schemeClr val="tx1"/>
-                      </a:solidFill>
-                      <a:prstDash val="solid"/>
-                    </a:lnT>
-                    <a:lnB w="12700">
-                      <a:solidFill>
-                        <a:schemeClr val="tx1"/>
-                      </a:solidFill>
-                      <a:prstDash val="solid"/>
-                    </a:lnB>
-                    <a:lnTlToBr>
-                      <a:noFill/>
-                    </a:lnTlToBr>
-                    <a:lnBlToTr>
-                      <a:noFill/>
-                    </a:lnBlToTr>
-                    <a:noFill/>
-                  </a:tcPr>
-                </a:tc>
-                <a:tc vMerge="1">
-                  <a:tcPr>
-                    <a:lnL w="12700">
-                      <a:solidFill>
-                        <a:schemeClr val="tx1"/>
-                      </a:solidFill>
-                      <a:prstDash val="solid"/>
-                    </a:lnL>
-                    <a:lnR w="12700">
-                      <a:solidFill>
-                        <a:schemeClr val="tx1"/>
-                      </a:solidFill>
-                      <a:prstDash val="solid"/>
-                    </a:lnR>
-                    <a:lnB w="12700">
-                      <a:solidFill>
-                        <a:schemeClr val="tx1"/>
-                      </a:solidFill>
-                      <a:prstDash val="solid"/>
-                    </a:lnB>
-                  </a:tcPr>
-                </a:tc>
-              </a:tr>
-            </a:tbl>
-          </a:graphicData>
-        </a:graphic>
-      </p:graphicFrame>
-      <p:sp>
-        <p:nvSpPr>
-          <p:cNvPr id="4" name="Text Box 3"/>
-          <p:cNvSpPr txBox="1"/>
-          <p:nvPr/>
-        </p:nvSpPr>
-        <p:spPr>
-          <a:xfrm>
-            <a:off x="731520" y="4098290"/>
-            <a:ext cx="6332855" cy="916305"/>
-          </a:xfrm>
-          <a:prstGeom prst="rect">
-            <a:avLst/>
-          </a:prstGeom>
-          <a:noFill/>
-        </p:spPr>
-        <p:txBody>
-          <a:bodyPr wrap="none" rtlCol="0">
-            <a:spAutoFit/>
-          </a:bodyPr>
-          <a:p>
-            <a:r>
-              <a:rPr lang="x-none" altLang="en-US"/>
-              <a:t>Critial path delay: </a:t>
-            </a:r>
-            <a:r>
-              <a:rPr lang="x-none" altLang="en-US" b="1"/>
-              <a:t>38 ns</a:t>
-            </a:r>
-            <a:endParaRPr lang="x-none" altLang="en-US" b="1"/>
-          </a:p>
-          <a:p>
-            <a:r>
-              <a:rPr lang="x-none" altLang="en-US"/>
-              <a:t>Clock frequency:  </a:t>
-            </a:r>
-            <a:r>
-              <a:rPr lang="x-none" altLang="en-US" b="1"/>
-              <a:t>25 MHz</a:t>
-            </a:r>
-            <a:endParaRPr lang="x-none" altLang="en-US" b="1"/>
-          </a:p>
-          <a:p>
-            <a:r>
-              <a:rPr lang="x-none" altLang="en-US"/>
-              <a:t>Latency (cycles used in key-gen, encryption and decryption):</a:t>
-            </a:r>
-            <a:endParaRPr lang="x-none" altLang="en-US"/>
-          </a:p>
-        </p:txBody>
-      </p:sp>
-      <p:sp>
-        <p:nvSpPr>
-          <p:cNvPr id="5" name="Right Arrow 4"/>
-          <p:cNvSpPr/>
-          <p:nvPr/>
-        </p:nvSpPr>
-        <p:spPr>
-          <a:xfrm rot="18780000">
-            <a:off x="7833360" y="3785870"/>
-            <a:ext cx="358140" cy="106680"/>
-          </a:xfrm>
-          <a:prstGeom prst="rightArrow">
-            <a:avLst/>
-          </a:prstGeom>
-          <a:solidFill>
-            <a:srgbClr val="FE5300"/>
-          </a:solidFill>
-          <a:ln>
-            <a:noFill/>
-          </a:ln>
-        </p:spPr>
-        <p:style>
-          <a:lnRef idx="2">
-            <a:schemeClr val="accent1">
-              <a:shade val="50000"/>
-            </a:schemeClr>
-          </a:lnRef>
-          <a:fillRef idx="1">
-            <a:schemeClr val="accent1"/>
-          </a:fillRef>
-          <a:effectRef idx="0">
-            <a:schemeClr val="accent1"/>
-          </a:effectRef>
-          <a:fontRef idx="minor">
-            <a:schemeClr val="lt1"/>
-          </a:fontRef>
-        </p:style>
-        <p:txBody>
-          <a:bodyPr rtlCol="0" anchor="ctr"/>
-          <a:p>
-            <a:pPr algn="ctr"/>
-            <a:endParaRPr lang="en-US"/>
-          </a:p>
-        </p:txBody>
-      </p:sp>
-    </p:spTree>
-  </p:cSld>
-  <p:clrMapOvr>
-    <a:masterClrMapping/>
-  </p:clrMapOvr>
-</p:sld>
-</file>
-
-<file path=ppt/slides/slide3.xml><?xml version="1.0" encoding="utf-8"?>
-<p:sld xmlns:a="http://schemas.openxmlformats.org/drawingml/2006/main" xmlns:r="http://schemas.openxmlformats.org/officeDocument/2006/relationships" xmlns:p="http://schemas.openxmlformats.org/presentationml/2006/main">
-  <p:cSld>
-    <p:spTree>
-      <p:nvGrpSpPr>
-        <p:cNvPr id="1" name=""/>
-        <p:cNvGrpSpPr/>
-        <p:nvPr/>
-      </p:nvGrpSpPr>
-      <p:grpSpPr/>
       <p:pic>
         <p:nvPicPr>
           <p:cNvPr id="5" name="Picture 4"/>
@@ -7099,7 +5584,7 @@
 </p:sld>
 </file>
 
-<file path=ppt/slides/slide4.xml><?xml version="1.0" encoding="utf-8"?>
+<file path=ppt/slides/slide3.xml><?xml version="1.0" encoding="utf-8"?>
 <p:sld xmlns:a="http://schemas.openxmlformats.org/drawingml/2006/main" xmlns:r="http://schemas.openxmlformats.org/officeDocument/2006/relationships" xmlns:p="http://schemas.openxmlformats.org/presentationml/2006/main">
   <p:cSld>
     <p:spTree>
@@ -7873,7 +6358,7 @@
 </p:sld>
 </file>
 
-<file path=ppt/slides/slide5.xml><?xml version="1.0" encoding="utf-8"?>
+<file path=ppt/slides/slide4.xml><?xml version="1.0" encoding="utf-8"?>
 <p:sld xmlns:a="http://schemas.openxmlformats.org/drawingml/2006/main" xmlns:r="http://schemas.openxmlformats.org/officeDocument/2006/relationships" xmlns:p="http://schemas.openxmlformats.org/presentationml/2006/main">
   <p:cSld>
     <p:spTree>
@@ -8836,11 +7321,7 @@
             </a:pPr>
             <a:r>
               <a:rPr lang="x-none" altLang="en-US"/>
-              <a:t>If btn0 </a:t>
-            </a:r>
-            <a:r>
-              <a:rPr lang="x-none" altLang="en-US"/>
-              <a:t>is not pressed, r31 = '0'. BNE becomes True. The code will keep looping.</a:t>
+              <a:t>If btn0 is not pressed, r31 = '0'. BNE becomes True. The code will keep looping.</a:t>
             </a:r>
             <a:endParaRPr lang="x-none" altLang="en-US"/>
           </a:p>
@@ -8944,7 +7425,7 @@
 </p:sld>
 </file>
 
-<file path=ppt/slides/slide6.xml><?xml version="1.0" encoding="utf-8"?>
+<file path=ppt/slides/slide5.xml><?xml version="1.0" encoding="utf-8"?>
 <p:sld xmlns:a="http://schemas.openxmlformats.org/drawingml/2006/main" xmlns:r="http://schemas.openxmlformats.org/officeDocument/2006/relationships" xmlns:p="http://schemas.openxmlformats.org/presentationml/2006/main">
   <p:cSld>
     <p:spTree>
@@ -9018,7 +7499,7 @@
         </p:blipFill>
         <p:spPr>
           <a:xfrm>
-            <a:off x="1362710" y="4168775"/>
+            <a:off x="1289050" y="4168775"/>
             <a:ext cx="6101080" cy="2367280"/>
           </a:xfrm>
           <a:prstGeom prst="rect">
@@ -9063,7 +7544,7 @@
         </p:nvSpPr>
         <p:spPr>
           <a:xfrm>
-            <a:off x="1343660" y="3800475"/>
+            <a:off x="1254125" y="3808730"/>
             <a:ext cx="5988050" cy="367665"/>
           </a:xfrm>
           <a:prstGeom prst="rect">
@@ -9128,7 +7609,7 @@
         </p:blipFill>
         <p:spPr>
           <a:xfrm>
-            <a:off x="1957705" y="5476240"/>
+            <a:off x="1881505" y="5476240"/>
             <a:ext cx="149860" cy="149860"/>
           </a:xfrm>
           <a:prstGeom prst="rect">
@@ -9144,7 +7625,7 @@
 </p:sld>
 </file>
 
-<file path=ppt/slides/slide7.xml><?xml version="1.0" encoding="utf-8"?>
+<file path=ppt/slides/slide6.xml><?xml version="1.0" encoding="utf-8"?>
 <p:sld xmlns:a="http://schemas.openxmlformats.org/drawingml/2006/main" xmlns:r="http://schemas.openxmlformats.org/officeDocument/2006/relationships" xmlns:p="http://schemas.openxmlformats.org/presentationml/2006/main">
   <p:cSld>
     <p:spTree>

</xml_diff>